<commit_message>
hot fix the preprocess worker
</commit_message>
<xml_diff>
--- a/Audience 站台1.3.pptx
+++ b/Audience 站台1.3.pptx
@@ -2397,11 +2397,7 @@
         <a:p>
           <a:r>
             <a:rPr lang="zh-TW" altLang="en-US" dirty="0" smtClean="0"/>
-            <a:t>資料整備</a:t>
-          </a:r>
-          <a:r>
-            <a:rPr lang="zh-TW" altLang="en-US" dirty="0" smtClean="0"/>
-            <a:t>任務首頁</a:t>
+            <a:t>資料整備任務首頁</a:t>
           </a:r>
           <a:endParaRPr lang="zh-TW" altLang="en-US" dirty="0"/>
         </a:p>
@@ -2543,6 +2539,13 @@
         </dgm:presLayoutVars>
       </dgm:prSet>
       <dgm:spPr/>
+      <dgm:t>
+        <a:bodyPr/>
+        <a:lstStyle/>
+        <a:p>
+          <a:endParaRPr lang="zh-TW" altLang="en-US"/>
+        </a:p>
+      </dgm:t>
     </dgm:pt>
     <dgm:pt modelId="{23AC9E4B-86FF-4D6B-A39A-8F1CB515DC59}" type="pres">
       <dgm:prSet presAssocID="{C3D746ED-026F-4890-B0B2-11A1DA8822BB}" presName="parTxOnlySpace" presStyleCnt="0"/>
@@ -2567,12 +2570,12 @@
     </dgm:pt>
   </dgm:ptLst>
   <dgm:cxnLst>
-    <dgm:cxn modelId="{03B3A893-3154-47E4-ABD9-3E7EDCA45FDB}" type="presOf" srcId="{F1798214-3DEB-4C64-BCDD-96B10672DD82}" destId="{08DF01E0-1C8C-437C-B2B4-DDF39323D80B}" srcOrd="0" destOrd="0" presId="urn:microsoft.com/office/officeart/2005/8/layout/chevron1"/>
     <dgm:cxn modelId="{7E1ED154-8E6B-40CA-B1DE-C1023CEAC0A0}" srcId="{19668F36-E1FC-4CC4-939B-551BE6C396AF}" destId="{23929B48-933B-4F58-ADAA-126ADDC4BB6B}" srcOrd="2" destOrd="0" parTransId="{215DFA78-D70B-418E-A7A9-20757B61F775}" sibTransId="{1AE907E7-66D6-4226-8302-BC0A58191065}"/>
+    <dgm:cxn modelId="{A927DAC6-1248-4F7F-919D-BCB548471AC9}" type="presOf" srcId="{673952DA-4D6F-4B61-BF2B-9FC70F95BB37}" destId="{F8058A13-5CC6-4918-8FEC-A091AA959942}" srcOrd="0" destOrd="0" presId="urn:microsoft.com/office/officeart/2005/8/layout/chevron1"/>
     <dgm:cxn modelId="{1D4C75F9-F3BF-4189-8AF7-623DE45D3F47}" type="presOf" srcId="{19668F36-E1FC-4CC4-939B-551BE6C396AF}" destId="{44042C89-39E9-4F29-844A-CD54959655BF}" srcOrd="0" destOrd="0" presId="urn:microsoft.com/office/officeart/2005/8/layout/chevron1"/>
-    <dgm:cxn modelId="{A927DAC6-1248-4F7F-919D-BCB548471AC9}" type="presOf" srcId="{673952DA-4D6F-4B61-BF2B-9FC70F95BB37}" destId="{F8058A13-5CC6-4918-8FEC-A091AA959942}" srcOrd="0" destOrd="0" presId="urn:microsoft.com/office/officeart/2005/8/layout/chevron1"/>
     <dgm:cxn modelId="{78C09D27-9762-409E-9528-2CA190961FB6}" srcId="{19668F36-E1FC-4CC4-939B-551BE6C396AF}" destId="{F1798214-3DEB-4C64-BCDD-96B10672DD82}" srcOrd="1" destOrd="0" parTransId="{E91D8549-964F-412D-8545-0521E5F7AF0B}" sibTransId="{C3D746ED-026F-4890-B0B2-11A1DA8822BB}"/>
     <dgm:cxn modelId="{4B7BE441-DA15-48F2-BA2B-65527F4DBCDF}" srcId="{19668F36-E1FC-4CC4-939B-551BE6C396AF}" destId="{673952DA-4D6F-4B61-BF2B-9FC70F95BB37}" srcOrd="0" destOrd="0" parTransId="{34823C18-2228-480F-92DE-3F22640F32C4}" sibTransId="{4DCCC1CB-CADC-4956-8736-E0DA72523A7B}"/>
+    <dgm:cxn modelId="{03B3A893-3154-47E4-ABD9-3E7EDCA45FDB}" type="presOf" srcId="{F1798214-3DEB-4C64-BCDD-96B10672DD82}" destId="{08DF01E0-1C8C-437C-B2B4-DDF39323D80B}" srcOrd="0" destOrd="0" presId="urn:microsoft.com/office/officeart/2005/8/layout/chevron1"/>
     <dgm:cxn modelId="{6EFD9BF6-70FC-4F22-B21B-4AAEA14D4584}" type="presOf" srcId="{23929B48-933B-4F58-ADAA-126ADDC4BB6B}" destId="{5D4C4677-B238-4252-BCD4-80A64F0162AA}" srcOrd="0" destOrd="0" presId="urn:microsoft.com/office/officeart/2005/8/layout/chevron1"/>
     <dgm:cxn modelId="{3360F0D9-209F-4758-B510-E0EA314C8DE1}" type="presParOf" srcId="{44042C89-39E9-4F29-844A-CD54959655BF}" destId="{F8058A13-5CC6-4918-8FEC-A091AA959942}" srcOrd="0" destOrd="0" presId="urn:microsoft.com/office/officeart/2005/8/layout/chevron1"/>
     <dgm:cxn modelId="{55A1F394-E056-4942-8DAC-C1301A69F45D}" type="presParOf" srcId="{44042C89-39E9-4F29-844A-CD54959655BF}" destId="{186FB4EC-956C-426C-B0E5-1720FB84E04A}" srcOrd="1" destOrd="0" presId="urn:microsoft.com/office/officeart/2005/8/layout/chevron1"/>
@@ -2651,11 +2654,7 @@
         <a:p>
           <a:r>
             <a:rPr lang="zh-TW" altLang="en-US" dirty="0" smtClean="0"/>
-            <a:t>返回</a:t>
-          </a:r>
-          <a:r>
-            <a:rPr lang="zh-TW" altLang="en-US" dirty="0" smtClean="0"/>
-            <a:t>資料整備</a:t>
+            <a:t>返回資料整備</a:t>
           </a:r>
           <a:r>
             <a:rPr lang="en-US" altLang="zh-TW" dirty="0" smtClean="0"/>
@@ -3144,11 +3143,7 @@
           </a:pPr>
           <a:r>
             <a:rPr lang="zh-TW" altLang="en-US" sz="2200" kern="1200" dirty="0" smtClean="0"/>
-            <a:t>資料整備</a:t>
-          </a:r>
-          <a:r>
-            <a:rPr lang="zh-TW" altLang="en-US" sz="2200" kern="1200" dirty="0" smtClean="0"/>
-            <a:t>任務首頁</a:t>
+            <a:t>資料整備任務首頁</a:t>
           </a:r>
           <a:endParaRPr lang="zh-TW" altLang="en-US" sz="2200" kern="1200" dirty="0"/>
         </a:p>
@@ -3462,11 +3457,7 @@
           </a:pPr>
           <a:r>
             <a:rPr lang="zh-TW" altLang="en-US" sz="2200" kern="1200" dirty="0" smtClean="0"/>
-            <a:t>返回</a:t>
-          </a:r>
-          <a:r>
-            <a:rPr lang="zh-TW" altLang="en-US" sz="2200" kern="1200" dirty="0" smtClean="0"/>
-            <a:t>資料整備</a:t>
+            <a:t>返回資料整備</a:t>
           </a:r>
           <a:r>
             <a:rPr lang="en-US" altLang="zh-TW" sz="2200" kern="1200" dirty="0" smtClean="0"/>
@@ -7843,7 +7834,7 @@
           <a:p>
             <a:fld id="{382FB120-3825-4D62-921C-DF42524C17EA}" type="datetimeFigureOut">
               <a:rPr lang="zh-TW" altLang="en-US" smtClean="0"/>
-              <a:t>2022/5/6</a:t>
+              <a:t>2022/5/17</a:t>
             </a:fld>
             <a:endParaRPr lang="zh-TW" altLang="en-US"/>
           </a:p>
@@ -8008,7 +7999,7 @@
           <a:p>
             <a:fld id="{530A4349-D281-4B78-AC93-54CE8D8AD712}" type="datetimeFigureOut">
               <a:rPr lang="zh-TW" altLang="en-US" smtClean="0"/>
-              <a:t>2022/5/6</a:t>
+              <a:t>2022/5/17</a:t>
             </a:fld>
             <a:endParaRPr lang="zh-TW" altLang="en-US"/>
           </a:p>
@@ -8407,7 +8398,7 @@
           <a:p>
             <a:fld id="{7AF05C7A-439A-4BF3-936E-833620F9E40E}" type="datetime1">
               <a:rPr lang="zh-TW" altLang="en-US" smtClean="0"/>
-              <a:t>2022/5/6</a:t>
+              <a:t>2022/5/17</a:t>
             </a:fld>
             <a:endParaRPr lang="zh-TW" altLang="en-US"/>
           </a:p>
@@ -8588,7 +8579,7 @@
           <a:p>
             <a:fld id="{DF0A4EF2-17A8-42EE-921C-4C6DBAFF2FF1}" type="datetime1">
               <a:rPr lang="zh-TW" altLang="en-US" smtClean="0"/>
-              <a:t>2022/5/6</a:t>
+              <a:t>2022/5/17</a:t>
             </a:fld>
             <a:endParaRPr lang="zh-TW" altLang="en-US"/>
           </a:p>
@@ -8772,7 +8763,7 @@
           <a:p>
             <a:fld id="{CAC2DA25-1288-4181-8488-D5A57BD2B4F7}" type="datetime1">
               <a:rPr lang="zh-TW" altLang="en-US" smtClean="0"/>
-              <a:t>2022/5/6</a:t>
+              <a:t>2022/5/17</a:t>
             </a:fld>
             <a:endParaRPr lang="zh-TW" altLang="en-US"/>
           </a:p>
@@ -8946,7 +8937,7 @@
           <a:p>
             <a:fld id="{CCADA845-EA09-4D6A-BF89-1638421FF2D9}" type="datetime1">
               <a:rPr lang="zh-TW" altLang="en-US" smtClean="0"/>
-              <a:t>2022/5/6</a:t>
+              <a:t>2022/5/17</a:t>
             </a:fld>
             <a:endParaRPr lang="zh-TW" altLang="en-US"/>
           </a:p>
@@ -9203,7 +9194,7 @@
           <a:p>
             <a:fld id="{AAE0C621-54A8-4239-A7EA-C7B192233E8B}" type="datetime1">
               <a:rPr lang="zh-TW" altLang="en-US" smtClean="0"/>
-              <a:t>2022/5/6</a:t>
+              <a:t>2022/5/17</a:t>
             </a:fld>
             <a:endParaRPr lang="zh-TW" altLang="en-US"/>
           </a:p>
@@ -9439,7 +9430,7 @@
           <a:p>
             <a:fld id="{22F766EE-BB84-460B-8161-75F2820F6252}" type="datetime1">
               <a:rPr lang="zh-TW" altLang="en-US" smtClean="0"/>
-              <a:t>2022/5/6</a:t>
+              <a:t>2022/5/17</a:t>
             </a:fld>
             <a:endParaRPr lang="zh-TW" altLang="en-US"/>
           </a:p>
@@ -9810,7 +9801,7 @@
           <a:p>
             <a:fld id="{E779D1D1-DBEC-4DE4-B1E3-4341D7211761}" type="datetime1">
               <a:rPr lang="zh-TW" altLang="en-US" smtClean="0"/>
-              <a:t>2022/5/6</a:t>
+              <a:t>2022/5/17</a:t>
             </a:fld>
             <a:endParaRPr lang="zh-TW" altLang="en-US"/>
           </a:p>
@@ -9932,7 +9923,7 @@
           <a:p>
             <a:fld id="{056B1B58-4A71-4042-AFAF-141BDE108225}" type="datetime1">
               <a:rPr lang="zh-TW" altLang="en-US" smtClean="0"/>
-              <a:t>2022/5/6</a:t>
+              <a:t>2022/5/17</a:t>
             </a:fld>
             <a:endParaRPr lang="zh-TW" altLang="en-US"/>
           </a:p>
@@ -10031,7 +10022,7 @@
           <a:p>
             <a:fld id="{72457DC6-A83E-479C-8DCA-F8885098336A}" type="datetime1">
               <a:rPr lang="zh-TW" altLang="en-US" smtClean="0"/>
-              <a:t>2022/5/6</a:t>
+              <a:t>2022/5/17</a:t>
             </a:fld>
             <a:endParaRPr lang="zh-TW" altLang="en-US"/>
           </a:p>
@@ -10312,7 +10303,7 @@
           <a:p>
             <a:fld id="{BC33C400-922E-4971-9833-AF614FF11188}" type="datetime1">
               <a:rPr lang="zh-TW" altLang="en-US" smtClean="0"/>
-              <a:t>2022/5/6</a:t>
+              <a:t>2022/5/17</a:t>
             </a:fld>
             <a:endParaRPr lang="zh-TW" altLang="en-US"/>
           </a:p>
@@ -10569,7 +10560,7 @@
           <a:p>
             <a:fld id="{DD4B1CB1-9B3D-48D8-A1FF-B0F89BEE47DC}" type="datetime1">
               <a:rPr lang="zh-TW" altLang="en-US" smtClean="0"/>
-              <a:t>2022/5/6</a:t>
+              <a:t>2022/5/17</a:t>
             </a:fld>
             <a:endParaRPr lang="zh-TW" altLang="en-US"/>
           </a:p>
@@ -10834,7 +10825,7 @@
           <a:p>
             <a:fld id="{BEFFEEE5-7EF5-4B2F-8E4C-AB2D76AADEE3}" type="datetime1">
               <a:rPr lang="zh-TW" altLang="en-US" smtClean="0"/>
-              <a:t>2022/5/6</a:t>
+              <a:t>2022/5/17</a:t>
             </a:fld>
             <a:endParaRPr lang="zh-TW" altLang="en-US"/>
           </a:p>
@@ -11332,7 +11323,7 @@
           <a:p>
             <a:fld id="{E8025ADE-DB38-4523-AB12-FC69B8371723}" type="datetime1">
               <a:rPr lang="zh-TW" altLang="en-US" smtClean="0"/>
-              <a:t>2022/5/6</a:t>
+              <a:t>2022/5/17</a:t>
             </a:fld>
             <a:endParaRPr lang="zh-TW" altLang="en-US"/>
           </a:p>
@@ -11507,7 +11498,7 @@
           <a:p>
             <a:fld id="{CCADA845-EA09-4D6A-BF89-1638421FF2D9}" type="datetime1">
               <a:rPr lang="zh-TW" altLang="en-US" smtClean="0"/>
-              <a:t>2022/5/6</a:t>
+              <a:t>2022/5/17</a:t>
             </a:fld>
             <a:endParaRPr lang="zh-TW" altLang="en-US"/>
           </a:p>
@@ -11921,7 +11912,7 @@
           <a:p>
             <a:fld id="{CCADA845-EA09-4D6A-BF89-1638421FF2D9}" type="datetime1">
               <a:rPr lang="zh-TW" altLang="en-US" smtClean="0"/>
-              <a:t>2022/5/6</a:t>
+              <a:t>2022/5/17</a:t>
             </a:fld>
             <a:endParaRPr lang="zh-TW" altLang="en-US"/>
           </a:p>
@@ -12153,7 +12144,7 @@
           <a:p>
             <a:fld id="{CCADA845-EA09-4D6A-BF89-1638421FF2D9}" type="datetime1">
               <a:rPr lang="zh-TW" altLang="en-US" smtClean="0"/>
-              <a:t>2022/5/6</a:t>
+              <a:t>2022/5/17</a:t>
             </a:fld>
             <a:endParaRPr lang="zh-TW" altLang="en-US"/>
           </a:p>
@@ -12342,7 +12333,7 @@
           <a:p>
             <a:fld id="{CCADA845-EA09-4D6A-BF89-1638421FF2D9}" type="datetime1">
               <a:rPr lang="zh-TW" altLang="en-US" smtClean="0"/>
-              <a:t>2022/5/6</a:t>
+              <a:t>2022/5/17</a:t>
             </a:fld>
             <a:endParaRPr lang="zh-TW" altLang="en-US"/>
           </a:p>
@@ -12830,7 +12821,7 @@
           <a:p>
             <a:fld id="{CCADA845-EA09-4D6A-BF89-1638421FF2D9}" type="datetime1">
               <a:rPr lang="zh-TW" altLang="en-US" smtClean="0"/>
-              <a:t>2022/5/6</a:t>
+              <a:t>2022/5/17</a:t>
             </a:fld>
             <a:endParaRPr lang="zh-TW" altLang="en-US"/>
           </a:p>
@@ -13178,7 +13169,7 @@
           <a:p>
             <a:fld id="{CCADA845-EA09-4D6A-BF89-1638421FF2D9}" type="datetime1">
               <a:rPr lang="zh-TW" altLang="en-US" smtClean="0"/>
-              <a:t>2022/5/6</a:t>
+              <a:t>2022/5/17</a:t>
             </a:fld>
             <a:endParaRPr lang="zh-TW" altLang="en-US"/>
           </a:p>
@@ -13581,7 +13572,7 @@
           <a:p>
             <a:fld id="{CCADA845-EA09-4D6A-BF89-1638421FF2D9}" type="datetime1">
               <a:rPr lang="zh-TW" altLang="en-US" smtClean="0"/>
-              <a:t>2022/5/6</a:t>
+              <a:t>2022/5/17</a:t>
             </a:fld>
             <a:endParaRPr lang="zh-TW" altLang="en-US"/>
           </a:p>
@@ -13855,7 +13846,7 @@
           <a:p>
             <a:fld id="{CCADA845-EA09-4D6A-BF89-1638421FF2D9}" type="datetime1">
               <a:rPr lang="zh-TW" altLang="en-US" smtClean="0"/>
-              <a:t>2022/5/6</a:t>
+              <a:t>2022/5/17</a:t>
             </a:fld>
             <a:endParaRPr lang="zh-TW" altLang="en-US"/>
           </a:p>
@@ -14222,7 +14213,7 @@
           <a:p>
             <a:fld id="{CCADA845-EA09-4D6A-BF89-1638421FF2D9}" type="datetime1">
               <a:rPr lang="zh-TW" altLang="en-US" smtClean="0"/>
-              <a:t>2022/5/6</a:t>
+              <a:t>2022/5/17</a:t>
             </a:fld>
             <a:endParaRPr lang="zh-TW" altLang="en-US"/>
           </a:p>
@@ -14448,7 +14439,42 @@
             </a:r>
             <a:r>
               <a:rPr lang="zh-TW" altLang="en-US" dirty="0" smtClean="0"/>
-              <a:t> 教學，建議先行參考後再開始貼標。</a:t>
+              <a:t> 教學，建議先行參考後再開始貼標</a:t>
+            </a:r>
+            <a:r>
+              <a:rPr lang="zh-TW" altLang="en-US" dirty="0" smtClean="0"/>
+              <a:t>。</a:t>
+            </a:r>
+            <a:endParaRPr lang="en-US" altLang="zh-TW" dirty="0" smtClean="0"/>
+          </a:p>
+          <a:p>
+            <a:r>
+              <a:rPr lang="zh-TW" altLang="en-US" dirty="0" smtClean="0"/>
+              <a:t>若需要新增 </a:t>
+            </a:r>
+            <a:r>
+              <a:rPr lang="en-US" altLang="zh-TW" b="1" dirty="0" err="1" smtClean="0"/>
+              <a:t>doccano</a:t>
+            </a:r>
+            <a:r>
+              <a:rPr lang="zh-TW" altLang="en-US" dirty="0" smtClean="0"/>
+              <a:t> 使用者，請洽詢 </a:t>
+            </a:r>
+            <a:r>
+              <a:rPr lang="en-US" altLang="zh-TW" dirty="0" smtClean="0"/>
+              <a:t>rd2 </a:t>
+            </a:r>
+            <a:r>
+              <a:rPr lang="en-US" altLang="zh-TW" b="1" dirty="0" err="1" smtClean="0"/>
+              <a:t>doccano</a:t>
+            </a:r>
+            <a:r>
+              <a:rPr lang="en-US" altLang="zh-TW" dirty="0" smtClean="0"/>
+              <a:t> </a:t>
+            </a:r>
+            <a:r>
+              <a:rPr lang="zh-TW" altLang="en-US" dirty="0" smtClean="0"/>
+              <a:t>站台維護者。</a:t>
             </a:r>
             <a:endParaRPr lang="en-US" altLang="zh-TW" dirty="0" smtClean="0"/>
           </a:p>
@@ -14529,7 +14555,7 @@
           <a:p>
             <a:fld id="{CCADA845-EA09-4D6A-BF89-1638421FF2D9}" type="datetime1">
               <a:rPr lang="zh-TW" altLang="en-US" smtClean="0"/>
-              <a:t>2022/5/6</a:t>
+              <a:t>2022/5/17</a:t>
             </a:fld>
             <a:endParaRPr lang="zh-TW" altLang="en-US"/>
           </a:p>
@@ -14669,11 +14695,7 @@
             </a:pPr>
             <a:r>
               <a:rPr lang="zh-TW" altLang="en-US" dirty="0" smtClean="0"/>
-              <a:t>更新</a:t>
-            </a:r>
-            <a:r>
-              <a:rPr lang="zh-TW" altLang="en-US" dirty="0" smtClean="0"/>
-              <a:t>功能</a:t>
+              <a:t>更新功能</a:t>
             </a:r>
             <a:endParaRPr lang="en-US" altLang="zh-TW" dirty="0" smtClean="0"/>
           </a:p>
@@ -14718,7 +14740,7 @@
           <a:p>
             <a:fld id="{B31A8A56-AE46-4C3C-BFCC-D3DFA3988AFA}" type="datetime1">
               <a:rPr lang="zh-TW" altLang="en-US" smtClean="0"/>
-              <a:t>2022/5/6</a:t>
+              <a:t>2022/5/17</a:t>
             </a:fld>
             <a:endParaRPr lang="zh-TW" altLang="en-US"/>
           </a:p>
@@ -14979,7 +15001,7 @@
           <a:p>
             <a:fld id="{CCADA845-EA09-4D6A-BF89-1638421FF2D9}" type="datetime1">
               <a:rPr lang="zh-TW" altLang="en-US" smtClean="0"/>
-              <a:t>2022/5/6</a:t>
+              <a:t>2022/5/17</a:t>
             </a:fld>
             <a:endParaRPr lang="zh-TW" altLang="en-US"/>
           </a:p>
@@ -15211,11 +15233,7 @@
             <a:pPr lvl="1"/>
             <a:r>
               <a:rPr lang="zh-TW" altLang="en-US" dirty="0" smtClean="0"/>
-              <a:t>原有</a:t>
-            </a:r>
-            <a:r>
-              <a:rPr lang="zh-TW" altLang="en-US" dirty="0" smtClean="0"/>
-              <a:t>貼標與模型訓練流程不變</a:t>
+              <a:t>原有貼標與模型訓練流程不變</a:t>
             </a:r>
             <a:endParaRPr lang="en-US" altLang="zh-TW" dirty="0" smtClean="0"/>
           </a:p>
@@ -15291,7 +15309,7 @@
           <a:p>
             <a:fld id="{CCADA845-EA09-4D6A-BF89-1638421FF2D9}" type="datetime1">
               <a:rPr lang="zh-TW" altLang="en-US" smtClean="0"/>
-              <a:t>2022/5/6</a:t>
+              <a:t>2022/5/17</a:t>
             </a:fld>
             <a:endParaRPr lang="zh-TW" altLang="en-US"/>
           </a:p>
@@ -15495,7 +15513,7 @@
           <a:p>
             <a:fld id="{CCADA845-EA09-4D6A-BF89-1638421FF2D9}" type="datetime1">
               <a:rPr lang="zh-TW" altLang="en-US" smtClean="0"/>
-              <a:t>2022/5/6</a:t>
+              <a:t>2022/5/17</a:t>
             </a:fld>
             <a:endParaRPr lang="zh-TW" altLang="en-US"/>
           </a:p>
@@ -15675,7 +15693,7 @@
           <a:p>
             <a:fld id="{CCADA845-EA09-4D6A-BF89-1638421FF2D9}" type="datetime1">
               <a:rPr lang="zh-TW" altLang="en-US" smtClean="0"/>
-              <a:t>2022/5/6</a:t>
+              <a:t>2022/5/17</a:t>
             </a:fld>
             <a:endParaRPr lang="zh-TW" altLang="en-US"/>
           </a:p>
@@ -16153,7 +16171,7 @@
           <a:p>
             <a:fld id="{CCADA845-EA09-4D6A-BF89-1638421FF2D9}" type="datetime1">
               <a:rPr lang="zh-TW" altLang="en-US" smtClean="0"/>
-              <a:t>2022/5/6</a:t>
+              <a:t>2022/5/17</a:t>
             </a:fld>
             <a:endParaRPr lang="zh-TW" altLang="en-US"/>
           </a:p>
@@ -16405,7 +16423,7 @@
           <a:p>
             <a:fld id="{CCADA845-EA09-4D6A-BF89-1638421FF2D9}" type="datetime1">
               <a:rPr lang="zh-TW" altLang="en-US" smtClean="0"/>
-              <a:t>2022/5/6</a:t>
+              <a:t>2022/5/17</a:t>
             </a:fld>
             <a:endParaRPr lang="zh-TW" altLang="en-US"/>
           </a:p>
@@ -17017,7 +17035,7 @@
           <a:p>
             <a:fld id="{CCADA845-EA09-4D6A-BF89-1638421FF2D9}" type="datetime1">
               <a:rPr lang="zh-TW" altLang="en-US" smtClean="0"/>
-              <a:t>2022/5/6</a:t>
+              <a:t>2022/5/17</a:t>
             </a:fld>
             <a:endParaRPr lang="zh-TW" altLang="en-US"/>
           </a:p>
@@ -17231,7 +17249,7 @@
           <a:p>
             <a:fld id="{CCADA845-EA09-4D6A-BF89-1638421FF2D9}" type="datetime1">
               <a:rPr lang="zh-TW" altLang="en-US" smtClean="0"/>
-              <a:t>2022/5/6</a:t>
+              <a:t>2022/5/17</a:t>
             </a:fld>
             <a:endParaRPr lang="zh-TW" altLang="en-US"/>
           </a:p>

</xml_diff>